<commit_message>
Backing up documentation for viewing on laptop
</commit_message>
<xml_diff>
--- a/docs/Hand Tracking Glove - Project Presentation.pptx
+++ b/docs/Hand Tracking Glove - Project Presentation.pptx
@@ -8893,7 +8893,27 @@
             </a:pPr>
             <a:r>
               <a:rPr lang="en" dirty="0"/>
-              <a:t>Build “stretch” sensors out of conductive fabrics that change resistance as they stretch. Will be placed in voltage divider circuits on each MCP and PIP joint to capture voltage readings.</a:t>
+              <a:t>Flex sensors that change resistance as they bend on each MCP and PIP joint</a:t>
+            </a:r>
+            <a:r>
+              <a:rPr lang="en-US" dirty="0"/>
+              <a:t>.</a:t>
+            </a:r>
+          </a:p>
+          <a:p>
+            <a:pPr marL="457200" lvl="0" indent="-311150" algn="l" rtl="0">
+              <a:spcBef>
+                <a:spcPts val="0"/>
+              </a:spcBef>
+              <a:spcAft>
+                <a:spcPts val="0"/>
+              </a:spcAft>
+              <a:buSzPts val="1300"/>
+              <a:buChar char="●"/>
+            </a:pPr>
+            <a:r>
+              <a:rPr lang="en-US" dirty="0"/>
+              <a:t>Differential amplifiers and low-pass filters to increase ADC steps in target voltage range and to reduce noise.</a:t>
             </a:r>
             <a:endParaRPr dirty="0"/>
           </a:p>
@@ -8910,24 +8930,7 @@
             </a:pPr>
             <a:r>
               <a:rPr lang="en" dirty="0"/>
-              <a:t>Analog Multiplexers allow all 10 sensor voltages to be read using 2 ADC lines and a few mux select GPIO lines.</a:t>
-            </a:r>
-            <a:endParaRPr dirty="0"/>
-          </a:p>
-          <a:p>
-            <a:pPr marL="457200" lvl="0" indent="-311150" algn="l" rtl="0">
-              <a:spcBef>
-                <a:spcPts val="0"/>
-              </a:spcBef>
-              <a:spcAft>
-                <a:spcPts val="0"/>
-              </a:spcAft>
-              <a:buSzPts val="1300"/>
-              <a:buChar char="●"/>
-            </a:pPr>
-            <a:r>
-              <a:rPr lang="en" dirty="0"/>
-              <a:t>Accelerometer, gyroscope, and magnetometer sensors to calculate attitude and heading.</a:t>
+              <a:t>Accelerometer, gyroscope, and magnetometer sensors for use in attitude and heading calculation.</a:t>
             </a:r>
             <a:endParaRPr dirty="0"/>
           </a:p>
@@ -8960,8 +8963,30 @@
               <a:buChar char="●"/>
             </a:pPr>
             <a:r>
-              <a:rPr lang="en" dirty="0"/>
+              <a:rPr lang="en-US" dirty="0"/>
               <a:t>Li-ion rechargeable battery and voltage regulator as device power source.</a:t>
+            </a:r>
+          </a:p>
+          <a:p>
+            <a:pPr marL="457200" lvl="0" indent="-311150" algn="l" rtl="0">
+              <a:spcBef>
+                <a:spcPts val="0"/>
+              </a:spcBef>
+              <a:spcAft>
+                <a:spcPts val="0"/>
+              </a:spcAft>
+              <a:buSzPts val="1300"/>
+              <a:buChar char="●"/>
+            </a:pPr>
+            <a:r>
+              <a:rPr lang="en-US" dirty="0"/>
+              <a:t>Battery charger circuit - Constant Current, Constant Voltage (CCCV).</a:t>
+            </a:r>
+          </a:p>
+          <a:p>
+            <a:r>
+              <a:rPr lang="en-US" dirty="0"/>
+              <a:t>Speaker and amplifiers to play a short tune when glove is unplugged from charger, plugged into charger, or fully charged.</a:t>
             </a:r>
             <a:endParaRPr dirty="0"/>
           </a:p>
@@ -8978,41 +9003,15 @@
             </a:pPr>
             <a:r>
               <a:rPr lang="en" dirty="0"/>
-              <a:t>Constant Current, Constant Voltage (CCCV) battery charger circuit.</a:t>
+              <a:t>Waveform generator that selects frequencies in a </a:t>
             </a:r>
-            <a:endParaRPr dirty="0"/>
-          </a:p>
-          <a:p>
-            <a:pPr marL="457200" lvl="0" indent="-311150" algn="l" rtl="0">
-              <a:spcBef>
-                <a:spcPts val="0"/>
-              </a:spcBef>
-              <a:spcAft>
-                <a:spcPts val="0"/>
-              </a:spcAft>
-              <a:buSzPts val="1300"/>
-              <a:buChar char="●"/>
-            </a:pPr>
+            <a:r>
+              <a:rPr lang="en-US" dirty="0"/>
+              <a:t>4-note</a:t>
+            </a:r>
             <a:r>
               <a:rPr lang="en" dirty="0"/>
-              <a:t>Speaker to play a short tune when glove is plugged into charger or fully charged.</a:t>
-            </a:r>
-            <a:endParaRPr dirty="0"/>
-          </a:p>
-          <a:p>
-            <a:pPr marL="457200" lvl="0" indent="-311150" algn="l" rtl="0">
-              <a:spcBef>
-                <a:spcPts val="0"/>
-              </a:spcBef>
-              <a:spcAft>
-                <a:spcPts val="0"/>
-              </a:spcAft>
-              <a:buSzPts val="1300"/>
-              <a:buChar char="●"/>
-            </a:pPr>
-            <a:r>
-              <a:rPr lang="en" dirty="0"/>
-              <a:t>555 timer and class AB amplifier to generate 4 notes in the tune.</a:t>
+              <a:t> tune using a 555 timer, a 4029 up/down counter, a 4051 demux, and some additional logic gates.</a:t>
             </a:r>
           </a:p>
           <a:p>
@@ -9030,7 +9029,7 @@
               <a:rPr lang="en" dirty="0"/>
               <a:t>LCD to display battery charge percentage and Bluetooth connection status.</a:t>
             </a:r>
-            <a:endParaRPr dirty="0"/>
+            <a:endParaRPr lang="en-US" dirty="0"/>
           </a:p>
         </p:txBody>
       </p:sp>
@@ -9168,36 +9167,6 @@
           </a:p>
         </p:txBody>
       </p:sp>
-      <p:pic>
-        <p:nvPicPr>
-          <p:cNvPr id="3" name="Picture 2">
-            <a:extLst>
-              <a:ext uri="{FF2B5EF4-FFF2-40B4-BE49-F238E27FC236}">
-                <a16:creationId xmlns:a16="http://schemas.microsoft.com/office/drawing/2014/main" id="{7579939D-0973-4189-8821-4D18303A0B7F}"/>
-              </a:ext>
-            </a:extLst>
-          </p:cNvPr>
-          <p:cNvPicPr>
-            <a:picLocks noChangeAspect="1"/>
-          </p:cNvPicPr>
-          <p:nvPr/>
-        </p:nvPicPr>
-        <p:blipFill>
-          <a:blip r:embed="rId3"/>
-          <a:stretch>
-            <a:fillRect/>
-          </a:stretch>
-        </p:blipFill>
-        <p:spPr>
-          <a:xfrm>
-            <a:off x="1069040" y="1047641"/>
-            <a:ext cx="7005919" cy="3792419"/>
-          </a:xfrm>
-          <a:prstGeom prst="rect">
-            <a:avLst/>
-          </a:prstGeom>
-        </p:spPr>
-      </p:pic>
       <p:sp>
         <p:nvSpPr>
           <p:cNvPr id="5" name="Rectangle 4">
@@ -9261,6 +9230,36 @@
           </a:p>
         </p:txBody>
       </p:sp>
+      <p:pic>
+        <p:nvPicPr>
+          <p:cNvPr id="6" name="Picture 5" descr="Diagram, schematic&#10;&#10;Description automatically generated">
+            <a:extLst>
+              <a:ext uri="{FF2B5EF4-FFF2-40B4-BE49-F238E27FC236}">
+                <a16:creationId xmlns:a16="http://schemas.microsoft.com/office/drawing/2014/main" id="{78627BC1-AE68-4806-AA16-F6CC08E39446}"/>
+              </a:ext>
+            </a:extLst>
+          </p:cNvPr>
+          <p:cNvPicPr>
+            <a:picLocks noChangeAspect="1"/>
+          </p:cNvPicPr>
+          <p:nvPr/>
+        </p:nvPicPr>
+        <p:blipFill>
+          <a:blip r:embed="rId3"/>
+          <a:stretch>
+            <a:fillRect/>
+          </a:stretch>
+        </p:blipFill>
+        <p:spPr>
+          <a:xfrm>
+            <a:off x="991720" y="1047641"/>
+            <a:ext cx="6773956" cy="3839833"/>
+          </a:xfrm>
+          <a:prstGeom prst="rect">
+            <a:avLst/>
+          </a:prstGeom>
+        </p:spPr>
+      </p:pic>
     </p:spTree>
   </p:cSld>
   <p:clrMapOvr>
@@ -9381,7 +9380,7 @@
             </a:pPr>
             <a:r>
               <a:rPr lang="en" dirty="0"/>
-              <a:t>Collect all sensor data and transfer the data to the desktop application with minimum latency - I2C, UART, and ADC.</a:t>
+              <a:t>Collect all sensor data and transfer the data to the desktop application with minimum latency - I2C, UART, ADC, timers, interrupts.</a:t>
             </a:r>
             <a:endParaRPr dirty="0"/>
           </a:p>
@@ -9415,26 +9414,9 @@
             </a:pPr>
             <a:r>
               <a:rPr lang="en" dirty="0"/>
-              <a:t>Estimate remaining battery charge based on the battery’s discharge voltage diagram – ADC.</a:t>
+              <a:t>Estimate remaining battery charge based on the battery’s discharge voltage diagram - ADC.</a:t>
             </a:r>
-            <a:endParaRPr dirty="0"/>
-          </a:p>
-          <a:p>
-            <a:pPr marL="457200" lvl="0" indent="-311150" algn="l" rtl="0">
-              <a:spcBef>
-                <a:spcPts val="0"/>
-              </a:spcBef>
-              <a:spcAft>
-                <a:spcPts val="0"/>
-              </a:spcAft>
-              <a:buSzPts val="1300"/>
-              <a:buChar char="●"/>
-            </a:pPr>
-            <a:r>
-              <a:rPr lang="en" dirty="0"/>
-              <a:t>Control 555 timer to play specific notes in a tune – GPIO, timers, and interrupts.</a:t>
-            </a:r>
-            <a:endParaRPr dirty="0"/>
+            <a:endParaRPr lang="en-US" dirty="0"/>
           </a:p>
           <a:p>
             <a:pPr marL="0" lvl="0" indent="0" algn="l" rtl="0">
@@ -9447,10 +9429,9 @@
               <a:buNone/>
             </a:pPr>
             <a:r>
-              <a:rPr lang="en" b="1" dirty="0"/>
+              <a:rPr lang="en-US" b="1" dirty="0"/>
               <a:t>Desktop Application</a:t>
             </a:r>
-            <a:endParaRPr b="1" dirty="0"/>
           </a:p>
           <a:p>
             <a:pPr marL="457200" lvl="0" indent="-311150" algn="l" rtl="0">
@@ -9641,10 +9622,10 @@
       </p:sp>
       <p:pic>
         <p:nvPicPr>
-          <p:cNvPr id="6" name="Picture 5">
+          <p:cNvPr id="3" name="Picture 2">
             <a:extLst>
               <a:ext uri="{FF2B5EF4-FFF2-40B4-BE49-F238E27FC236}">
-                <a16:creationId xmlns:a16="http://schemas.microsoft.com/office/drawing/2014/main" id="{21FB029A-3C21-486E-AA1E-BF4565710077}"/>
+                <a16:creationId xmlns:a16="http://schemas.microsoft.com/office/drawing/2014/main" id="{CC5816A9-291C-4805-83A3-A9D793A782FE}"/>
               </a:ext>
             </a:extLst>
           </p:cNvPr>
@@ -9653,85 +9634,79 @@
           </p:cNvPicPr>
           <p:nvPr/>
         </p:nvPicPr>
-        <p:blipFill>
+        <p:blipFill rotWithShape="1">
           <a:blip r:embed="rId3"/>
-          <a:stretch>
-            <a:fillRect/>
-          </a:stretch>
+          <a:srcRect l="48366" r="2011" b="49071"/>
+          <a:stretch/>
         </p:blipFill>
         <p:spPr>
           <a:xfrm>
-            <a:off x="1143001" y="1040929"/>
-            <a:ext cx="7046258" cy="3828241"/>
+            <a:off x="3007403" y="1564717"/>
+            <a:ext cx="2385344" cy="2630766"/>
           </a:xfrm>
           <a:prstGeom prst="rect">
             <a:avLst/>
           </a:prstGeom>
         </p:spPr>
       </p:pic>
-      <p:sp>
-        <p:nvSpPr>
-          <p:cNvPr id="10" name="Rectangle 9">
+      <p:pic>
+        <p:nvPicPr>
+          <p:cNvPr id="8" name="Picture 7">
             <a:extLst>
               <a:ext uri="{FF2B5EF4-FFF2-40B4-BE49-F238E27FC236}">
-                <a16:creationId xmlns:a16="http://schemas.microsoft.com/office/drawing/2014/main" id="{68B559A1-8B4B-4017-B739-6D4659F731E0}"/>
+                <a16:creationId xmlns:a16="http://schemas.microsoft.com/office/drawing/2014/main" id="{E815CFBE-5AF7-4BB9-967D-EDEC09C47B2E}"/>
               </a:ext>
             </a:extLst>
           </p:cNvPr>
-          <p:cNvSpPr/>
+          <p:cNvPicPr>
+            <a:picLocks noChangeAspect="1"/>
+          </p:cNvPicPr>
           <p:nvPr/>
-        </p:nvSpPr>
+        </p:nvPicPr>
+        <p:blipFill rotWithShape="1">
+          <a:blip r:embed="rId3"/>
+          <a:srcRect l="48972" t="51637"/>
+          <a:stretch/>
+        </p:blipFill>
         <p:spPr>
           <a:xfrm>
-            <a:off x="517712" y="1040929"/>
-            <a:ext cx="625289" cy="364300"/>
+            <a:off x="5587253" y="1321854"/>
+            <a:ext cx="3207124" cy="3266390"/>
           </a:xfrm>
           <a:prstGeom prst="rect">
             <a:avLst/>
           </a:prstGeom>
-          <a:solidFill>
-            <a:schemeClr val="bg1"/>
-          </a:solidFill>
-          <a:ln>
-            <a:solidFill>
-              <a:schemeClr val="bg1"/>
-            </a:solidFill>
-          </a:ln>
         </p:spPr>
-        <p:style>
-          <a:lnRef idx="2">
-            <a:schemeClr val="accent1">
-              <a:shade val="50000"/>
-            </a:schemeClr>
-          </a:lnRef>
-          <a:fillRef idx="1">
-            <a:schemeClr val="accent1"/>
-          </a:fillRef>
-          <a:effectRef idx="0">
-            <a:schemeClr val="accent1"/>
-          </a:effectRef>
-          <a:fontRef idx="minor">
-            <a:schemeClr val="lt1"/>
-          </a:fontRef>
-        </p:style>
-        <p:txBody>
-          <a:bodyPr rtlCol="0" anchor="ctr"/>
-          <a:lstStyle/>
-          <a:p>
-            <a:pPr algn="ctr"/>
-            <a:endParaRPr lang="en-US">
-              <a:ln>
-                <a:solidFill>
-                  <a:schemeClr val="bg1"/>
-                </a:solidFill>
-              </a:ln>
-              <a:solidFill>
-                <a:schemeClr val="bg1"/>
-              </a:solidFill>
-            </a:endParaRPr>
-          </a:p>
-        </p:txBody>
-      </p:sp>
+      </p:pic>
+      <p:pic>
+        <p:nvPicPr>
+          <p:cNvPr id="9" name="Picture 8">
+            <a:extLst>
+              <a:ext uri="{FF2B5EF4-FFF2-40B4-BE49-F238E27FC236}">
+                <a16:creationId xmlns:a16="http://schemas.microsoft.com/office/drawing/2014/main" id="{108199F3-D0F4-4EE1-9BE3-171B862DC7C0}"/>
+              </a:ext>
+            </a:extLst>
+          </p:cNvPr>
+          <p:cNvPicPr>
+            <a:picLocks noChangeAspect="1"/>
+          </p:cNvPicPr>
+          <p:nvPr/>
+        </p:nvPicPr>
+        <p:blipFill rotWithShape="1">
+          <a:blip r:embed="rId3"/>
+          <a:srcRect t="-1" r="51465" b="38691"/>
+          <a:stretch/>
+        </p:blipFill>
+        <p:spPr>
+          <a:xfrm>
+            <a:off x="430306" y="1321854"/>
+            <a:ext cx="2333065" cy="3166976"/>
+          </a:xfrm>
+          <a:prstGeom prst="rect">
+            <a:avLst/>
+          </a:prstGeom>
+        </p:spPr>
+      </p:pic>
     </p:spTree>
   </p:cSld>
   <p:clrMapOvr>

</xml_diff>